<commit_message>
update Import mechanism and Backup Mechanism in UserGuide
</commit_message>
<xml_diff>
--- a/docs/diagrams/ImportSequenceDiagram.pptx
+++ b/docs/diagrams/ImportSequenceDiagram.pptx
@@ -212,7 +212,7 @@
           <a:p>
             <a:fld id="{F5CC4B3F-88C1-4FFA-B1B6-F41C21DC6924}" type="datetimeFigureOut">
               <a:rPr lang="en-US" smtClean="0"/>
-              <a:t>11/2/2017</a:t>
+              <a:t>11/12/2017</a:t>
             </a:fld>
             <a:endParaRPr lang="en-US"/>
           </a:p>
@@ -479,6 +479,90 @@
 </p:notesMaster>
 </file>
 
+<file path=ppt/notesSlides/notesSlide1.xml><?xml version="1.0" encoding="utf-8"?>
+<p:notes xmlns:a="http://schemas.openxmlformats.org/drawingml/2006/main" xmlns:r="http://schemas.openxmlformats.org/officeDocument/2006/relationships" xmlns:p="http://schemas.openxmlformats.org/presentationml/2006/main">
+  <p:cSld>
+    <p:spTree>
+      <p:nvGrpSpPr>
+        <p:cNvPr id="1" name=""/>
+        <p:cNvGrpSpPr/>
+        <p:nvPr/>
+      </p:nvGrpSpPr>
+      <p:grpSpPr>
+        <a:xfrm>
+          <a:off x="0" y="0"/>
+          <a:ext cx="0" cy="0"/>
+          <a:chOff x="0" y="0"/>
+          <a:chExt cx="0" cy="0"/>
+        </a:xfrm>
+      </p:grpSpPr>
+      <p:sp>
+        <p:nvSpPr>
+          <p:cNvPr id="2" name="Slide Image Placeholder 1"/>
+          <p:cNvSpPr>
+            <a:spLocks noGrp="1" noRot="1" noChangeAspect="1"/>
+          </p:cNvSpPr>
+          <p:nvPr>
+            <p:ph type="sldImg"/>
+          </p:nvPr>
+        </p:nvSpPr>
+        <p:spPr/>
+      </p:sp>
+      <p:sp>
+        <p:nvSpPr>
+          <p:cNvPr id="3" name="Notes Placeholder 2"/>
+          <p:cNvSpPr>
+            <a:spLocks noGrp="1"/>
+          </p:cNvSpPr>
+          <p:nvPr>
+            <p:ph type="body" idx="1"/>
+          </p:nvPr>
+        </p:nvSpPr>
+        <p:spPr/>
+        <p:txBody>
+          <a:bodyPr/>
+          <a:lstStyle/>
+          <a:p>
+            <a:endParaRPr lang="en-SG" dirty="0"/>
+          </a:p>
+        </p:txBody>
+      </p:sp>
+      <p:sp>
+        <p:nvSpPr>
+          <p:cNvPr id="4" name="Slide Number Placeholder 3"/>
+          <p:cNvSpPr>
+            <a:spLocks noGrp="1"/>
+          </p:cNvSpPr>
+          <p:nvPr>
+            <p:ph type="sldNum" sz="quarter" idx="10"/>
+          </p:nvPr>
+        </p:nvSpPr>
+        <p:spPr/>
+        <p:txBody>
+          <a:bodyPr/>
+          <a:lstStyle/>
+          <a:p>
+            <a:fld id="{5A7AB025-77E3-4BD1-A2FD-B3183DBA47A3}" type="slidenum">
+              <a:rPr lang="en-US" smtClean="0"/>
+              <a:t>1</a:t>
+            </a:fld>
+            <a:endParaRPr lang="en-US"/>
+          </a:p>
+        </p:txBody>
+      </p:sp>
+    </p:spTree>
+    <p:extLst>
+      <p:ext uri="{BB962C8B-B14F-4D97-AF65-F5344CB8AC3E}">
+        <p14:creationId xmlns:p14="http://schemas.microsoft.com/office/powerpoint/2010/main" val="3026498914"/>
+      </p:ext>
+    </p:extLst>
+  </p:cSld>
+  <p:clrMapOvr>
+    <a:masterClrMapping/>
+  </p:clrMapOvr>
+</p:notes>
+</file>
+
 <file path=ppt/slideLayouts/slideLayout1.xml><?xml version="1.0" encoding="utf-8"?>
 <p:sldLayout xmlns:a="http://schemas.openxmlformats.org/drawingml/2006/main" xmlns:r="http://schemas.openxmlformats.org/officeDocument/2006/relationships" xmlns:p="http://schemas.openxmlformats.org/presentationml/2006/main" type="title" preserve="1">
   <p:cSld name="Title Slide">
@@ -658,7 +742,7 @@
           <a:p>
             <a:fld id="{78C97017-6FC3-485B-9764-EAC9E56C1D49}" type="datetimeFigureOut">
               <a:rPr lang="en-US" smtClean="0"/>
-              <a:t>11/2/2017</a:t>
+              <a:t>11/12/2017</a:t>
             </a:fld>
             <a:endParaRPr lang="en-US"/>
           </a:p>
@@ -826,7 +910,7 @@
           <a:p>
             <a:fld id="{78C97017-6FC3-485B-9764-EAC9E56C1D49}" type="datetimeFigureOut">
               <a:rPr lang="en-US" smtClean="0"/>
-              <a:t>11/2/2017</a:t>
+              <a:t>11/12/2017</a:t>
             </a:fld>
             <a:endParaRPr lang="en-US"/>
           </a:p>
@@ -1004,7 +1088,7 @@
           <a:p>
             <a:fld id="{78C97017-6FC3-485B-9764-EAC9E56C1D49}" type="datetimeFigureOut">
               <a:rPr lang="en-US" smtClean="0"/>
-              <a:t>11/2/2017</a:t>
+              <a:t>11/12/2017</a:t>
             </a:fld>
             <a:endParaRPr lang="en-US"/>
           </a:p>
@@ -1172,7 +1256,7 @@
           <a:p>
             <a:fld id="{78C97017-6FC3-485B-9764-EAC9E56C1D49}" type="datetimeFigureOut">
               <a:rPr lang="en-US" smtClean="0"/>
-              <a:t>11/2/2017</a:t>
+              <a:t>11/12/2017</a:t>
             </a:fld>
             <a:endParaRPr lang="en-US"/>
           </a:p>
@@ -1417,7 +1501,7 @@
           <a:p>
             <a:fld id="{78C97017-6FC3-485B-9764-EAC9E56C1D49}" type="datetimeFigureOut">
               <a:rPr lang="en-US" smtClean="0"/>
-              <a:t>11/2/2017</a:t>
+              <a:t>11/12/2017</a:t>
             </a:fld>
             <a:endParaRPr lang="en-US"/>
           </a:p>
@@ -1702,7 +1786,7 @@
           <a:p>
             <a:fld id="{78C97017-6FC3-485B-9764-EAC9E56C1D49}" type="datetimeFigureOut">
               <a:rPr lang="en-US" smtClean="0"/>
-              <a:t>11/2/2017</a:t>
+              <a:t>11/12/2017</a:t>
             </a:fld>
             <a:endParaRPr lang="en-US"/>
           </a:p>
@@ -2121,7 +2205,7 @@
           <a:p>
             <a:fld id="{78C97017-6FC3-485B-9764-EAC9E56C1D49}" type="datetimeFigureOut">
               <a:rPr lang="en-US" smtClean="0"/>
-              <a:t>11/2/2017</a:t>
+              <a:t>11/12/2017</a:t>
             </a:fld>
             <a:endParaRPr lang="en-US"/>
           </a:p>
@@ -2238,7 +2322,7 @@
           <a:p>
             <a:fld id="{78C97017-6FC3-485B-9764-EAC9E56C1D49}" type="datetimeFigureOut">
               <a:rPr lang="en-US" smtClean="0"/>
-              <a:t>11/2/2017</a:t>
+              <a:t>11/12/2017</a:t>
             </a:fld>
             <a:endParaRPr lang="en-US"/>
           </a:p>
@@ -2333,7 +2417,7 @@
           <a:p>
             <a:fld id="{78C97017-6FC3-485B-9764-EAC9E56C1D49}" type="datetimeFigureOut">
               <a:rPr lang="en-US" smtClean="0"/>
-              <a:t>11/2/2017</a:t>
+              <a:t>11/12/2017</a:t>
             </a:fld>
             <a:endParaRPr lang="en-US"/>
           </a:p>
@@ -2608,7 +2692,7 @@
           <a:p>
             <a:fld id="{78C97017-6FC3-485B-9764-EAC9E56C1D49}" type="datetimeFigureOut">
               <a:rPr lang="en-US" smtClean="0"/>
-              <a:t>11/2/2017</a:t>
+              <a:t>11/12/2017</a:t>
             </a:fld>
             <a:endParaRPr lang="en-US"/>
           </a:p>
@@ -2860,7 +2944,7 @@
           <a:p>
             <a:fld id="{78C97017-6FC3-485B-9764-EAC9E56C1D49}" type="datetimeFigureOut">
               <a:rPr lang="en-US" smtClean="0"/>
-              <a:t>11/2/2017</a:t>
+              <a:t>11/12/2017</a:t>
             </a:fld>
             <a:endParaRPr lang="en-US"/>
           </a:p>
@@ -3071,7 +3155,7 @@
           <a:p>
             <a:fld id="{78C97017-6FC3-485B-9764-EAC9E56C1D49}" type="datetimeFigureOut">
               <a:rPr lang="en-US" smtClean="0"/>
-              <a:t>11/2/2017</a:t>
+              <a:t>11/12/2017</a:t>
             </a:fld>
             <a:endParaRPr lang="en-US"/>
           </a:p>
@@ -3568,8 +3652,8 @@
         </p:nvSpPr>
         <p:spPr>
           <a:xfrm>
-            <a:off x="57630" y="107166"/>
-            <a:ext cx="9772169" cy="6224380"/>
+            <a:off x="57631" y="107165"/>
+            <a:ext cx="9499536" cy="6041071"/>
           </a:xfrm>
           <a:prstGeom prst="roundRect">
             <a:avLst>
@@ -3629,8 +3713,8 @@
         </p:nvSpPr>
         <p:spPr>
           <a:xfrm>
-            <a:off x="159245" y="620146"/>
-            <a:ext cx="1455629" cy="346760"/>
+            <a:off x="239765" y="709759"/>
+            <a:ext cx="1288554" cy="257147"/>
           </a:xfrm>
           <a:prstGeom prst="rect">
             <a:avLst/>
@@ -3665,7 +3749,7 @@
           <a:p>
             <a:pPr algn="ctr"/>
             <a:r>
-              <a:rPr lang="en-US" sz="1600" dirty="0">
+              <a:rPr lang="en-US" sz="1200" dirty="0">
                 <a:solidFill>
                   <a:schemeClr val="bg1"/>
                 </a:solidFill>
@@ -3673,14 +3757,14 @@
               <a:t>:</a:t>
             </a:r>
             <a:r>
-              <a:rPr lang="en-US" sz="1600" dirty="0" err="1">
+              <a:rPr lang="en-US" sz="1200" dirty="0" err="1">
                 <a:solidFill>
                   <a:schemeClr val="bg1"/>
                 </a:solidFill>
               </a:rPr>
               <a:t>LogicManager</a:t>
             </a:r>
-            <a:endParaRPr lang="en-SG" sz="1600" dirty="0">
+            <a:endParaRPr lang="en-SG" sz="1200" dirty="0">
               <a:solidFill>
                 <a:schemeClr val="bg1"/>
               </a:solidFill>
@@ -3782,8 +3866,8 @@
         </p:nvSpPr>
         <p:spPr>
           <a:xfrm>
-            <a:off x="2448829" y="710736"/>
-            <a:ext cx="1706312" cy="333417"/>
+            <a:off x="2448829" y="774530"/>
+            <a:ext cx="1706312" cy="269623"/>
           </a:xfrm>
           <a:prstGeom prst="rect">
             <a:avLst/>
@@ -3888,8 +3972,8 @@
         </p:nvSpPr>
         <p:spPr>
           <a:xfrm>
-            <a:off x="3236634" y="1344700"/>
-            <a:ext cx="220430" cy="2738019"/>
+            <a:off x="3237334" y="1461735"/>
+            <a:ext cx="198647" cy="3645207"/>
           </a:xfrm>
           <a:prstGeom prst="rect">
             <a:avLst/>
@@ -3940,9 +4024,9 @@
           <p:nvPr/>
         </p:nvCxnSpPr>
         <p:spPr>
-          <a:xfrm flipH="1">
-            <a:off x="5019025" y="1690081"/>
-            <a:ext cx="61970" cy="2439742"/>
+          <a:xfrm>
+            <a:off x="5789626" y="1651810"/>
+            <a:ext cx="0" cy="3462985"/>
           </a:xfrm>
           <a:prstGeom prst="line">
             <a:avLst/>
@@ -3978,8 +4062,8 @@
         </p:nvSpPr>
         <p:spPr>
           <a:xfrm>
-            <a:off x="4928561" y="1698219"/>
-            <a:ext cx="181489" cy="2224536"/>
+            <a:off x="5654874" y="1568256"/>
+            <a:ext cx="243888" cy="419176"/>
           </a:xfrm>
           <a:prstGeom prst="rect">
             <a:avLst/>
@@ -4061,8 +4145,8 @@
         </p:nvSpPr>
         <p:spPr>
           <a:xfrm>
-            <a:off x="-685800" y="1066800"/>
-            <a:ext cx="1424846" cy="184666"/>
+            <a:off x="-1382916" y="1117863"/>
+            <a:ext cx="2144207" cy="169277"/>
           </a:xfrm>
           <a:prstGeom prst="rect">
             <a:avLst/>
@@ -4077,12 +4161,28 @@
           <a:p>
             <a:pPr algn="r"/>
             <a:r>
-              <a:rPr lang="en-US" sz="1200" dirty="0">
+              <a:rPr lang="en-US" sz="1100" dirty="0">
                 <a:solidFill>
                   <a:srgbClr val="0070C0"/>
                 </a:solidFill>
               </a:rPr>
-              <a:t>execute(“import”)</a:t>
+              <a:t>execute(“import </a:t>
+            </a:r>
+            <a:r>
+              <a:rPr lang="en-US" sz="1100" dirty="0" err="1">
+                <a:solidFill>
+                  <a:srgbClr val="0070C0"/>
+                </a:solidFill>
+              </a:rPr>
+              <a:t>ark_save</a:t>
+            </a:r>
+            <a:r>
+              <a:rPr lang="en-US" sz="1100" dirty="0">
+                <a:solidFill>
+                  <a:srgbClr val="0070C0"/>
+                </a:solidFill>
+              </a:rPr>
+              <a:t>”)</a:t>
             </a:r>
           </a:p>
         </p:txBody>
@@ -4090,13 +4190,16 @@
       <p:cxnSp>
         <p:nvCxnSpPr>
           <p:cNvPr id="28" name="Straight Arrow Connector 27"/>
-          <p:cNvCxnSpPr/>
+          <p:cNvCxnSpPr>
+            <a:cxnSpLocks/>
+            <a:endCxn id="19" idx="1"/>
+          </p:cNvCxnSpPr>
           <p:nvPr/>
         </p:nvCxnSpPr>
         <p:spPr>
           <a:xfrm flipV="1">
-            <a:off x="3412072" y="1588540"/>
-            <a:ext cx="922392" cy="1"/>
+            <a:off x="3435981" y="1596549"/>
+            <a:ext cx="1514445" cy="8557"/>
           </a:xfrm>
           <a:prstGeom prst="straightConnector1">
             <a:avLst/>
@@ -4123,16 +4226,135 @@
           </a:fontRef>
         </p:style>
       </p:cxnSp>
-      <p:sp>
-        <p:nvSpPr>
-          <p:cNvPr id="29" name="TextBox 28"/>
+      <p:cxnSp>
+        <p:nvCxnSpPr>
+          <p:cNvPr id="34" name="Straight Arrow Connector 33"/>
+          <p:cNvCxnSpPr>
+            <a:cxnSpLocks/>
+            <a:endCxn id="21" idx="2"/>
+          </p:cNvCxnSpPr>
+          <p:nvPr/>
+        </p:nvCxnSpPr>
+        <p:spPr>
+          <a:xfrm>
+            <a:off x="3457764" y="1987432"/>
+            <a:ext cx="2319054" cy="0"/>
+          </a:xfrm>
+          <a:prstGeom prst="straightConnector1">
+            <a:avLst/>
+          </a:prstGeom>
+          <a:ln w="19050">
+            <a:solidFill>
+              <a:srgbClr val="0070C0"/>
+            </a:solidFill>
+            <a:prstDash val="sysDash"/>
+            <a:headEnd type="arrow" w="med" len="med"/>
+            <a:tailEnd type="none" w="med" len="med"/>
+          </a:ln>
+        </p:spPr>
+        <p:style>
+          <a:lnRef idx="1">
+            <a:schemeClr val="accent1"/>
+          </a:lnRef>
+          <a:fillRef idx="0">
+            <a:schemeClr val="accent1"/>
+          </a:fillRef>
+          <a:effectRef idx="0">
+            <a:schemeClr val="accent1"/>
+          </a:effectRef>
+          <a:fontRef idx="minor">
+            <a:schemeClr val="tx1"/>
+          </a:fontRef>
+        </p:style>
+      </p:cxnSp>
+      <p:cxnSp>
+        <p:nvCxnSpPr>
+          <p:cNvPr id="35" name="Straight Arrow Connector 34"/>
+          <p:cNvCxnSpPr>
+            <a:cxnSpLocks/>
+          </p:cNvCxnSpPr>
+          <p:nvPr/>
+        </p:nvCxnSpPr>
+        <p:spPr>
+          <a:xfrm>
+            <a:off x="984343" y="5106942"/>
+            <a:ext cx="2348067" cy="0"/>
+          </a:xfrm>
+          <a:prstGeom prst="straightConnector1">
+            <a:avLst/>
+          </a:prstGeom>
+          <a:ln w="19050">
+            <a:solidFill>
+              <a:srgbClr val="0070C0"/>
+            </a:solidFill>
+            <a:prstDash val="sysDash"/>
+            <a:headEnd type="arrow" w="med" len="med"/>
+            <a:tailEnd type="none" w="med" len="med"/>
+          </a:ln>
+        </p:spPr>
+        <p:style>
+          <a:lnRef idx="1">
+            <a:schemeClr val="accent1"/>
+          </a:lnRef>
+          <a:fillRef idx="0">
+            <a:schemeClr val="accent1"/>
+          </a:fillRef>
+          <a:effectRef idx="0">
+            <a:schemeClr val="accent1"/>
+          </a:effectRef>
+          <a:fontRef idx="minor">
+            <a:schemeClr val="tx1"/>
+          </a:fontRef>
+        </p:style>
+      </p:cxnSp>
+      <p:cxnSp>
+        <p:nvCxnSpPr>
+          <p:cNvPr id="37" name="Straight Arrow Connector 36"/>
+          <p:cNvCxnSpPr/>
+          <p:nvPr/>
+        </p:nvCxnSpPr>
+        <p:spPr>
+          <a:xfrm>
+            <a:off x="-289991" y="6031523"/>
+            <a:ext cx="1196051" cy="0"/>
+          </a:xfrm>
+          <a:prstGeom prst="straightConnector1">
+            <a:avLst/>
+          </a:prstGeom>
+          <a:ln w="19050">
+            <a:solidFill>
+              <a:schemeClr val="accent1"/>
+            </a:solidFill>
+            <a:prstDash val="sysDash"/>
+            <a:headEnd type="arrow" w="med" len="med"/>
+            <a:tailEnd type="none" w="med" len="med"/>
+          </a:ln>
+        </p:spPr>
+        <p:style>
+          <a:lnRef idx="1">
+            <a:schemeClr val="accent1"/>
+          </a:lnRef>
+          <a:fillRef idx="0">
+            <a:schemeClr val="accent1"/>
+          </a:fillRef>
+          <a:effectRef idx="0">
+            <a:schemeClr val="accent1"/>
+          </a:effectRef>
+          <a:fontRef idx="minor">
+            <a:schemeClr val="tx1"/>
+          </a:fontRef>
+        </p:style>
+      </p:cxnSp>
+      <p:sp>
+        <p:nvSpPr>
+          <p:cNvPr id="80" name="TextBox 79"/>
           <p:cNvSpPr txBox="1"/>
           <p:nvPr/>
         </p:nvSpPr>
         <p:spPr>
           <a:xfrm>
-            <a:off x="2757199" y="4320274"/>
-            <a:ext cx="855809" cy="215444"/>
+            <a:off x="856613" y="1249872"/>
+            <a:ext cx="2214074" cy="169277"/>
           </a:xfrm>
           <a:prstGeom prst="rect">
             <a:avLst/>
@@ -4157,140 +4379,34 @@
           </a:lstStyle>
           <a:p>
             <a:r>
-              <a:rPr lang="en-US" dirty="0"/>
-              <a:t>execute()</a:t>
-            </a:r>
-          </a:p>
-        </p:txBody>
-      </p:sp>
-      <p:cxnSp>
-        <p:nvCxnSpPr>
-          <p:cNvPr id="34" name="Straight Arrow Connector 33"/>
-          <p:cNvCxnSpPr>
-            <a:cxnSpLocks/>
-          </p:cNvCxnSpPr>
-          <p:nvPr/>
-        </p:nvCxnSpPr>
-        <p:spPr>
-          <a:xfrm>
-            <a:off x="3454617" y="3922755"/>
-            <a:ext cx="1552767" cy="0"/>
-          </a:xfrm>
-          <a:prstGeom prst="straightConnector1">
-            <a:avLst/>
-          </a:prstGeom>
-          <a:ln w="19050">
-            <a:solidFill>
-              <a:srgbClr val="0070C0"/>
-            </a:solidFill>
-            <a:prstDash val="sysDash"/>
-            <a:headEnd type="arrow" w="med" len="med"/>
-            <a:tailEnd type="none" w="med" len="med"/>
-          </a:ln>
-        </p:spPr>
-        <p:style>
-          <a:lnRef idx="1">
-            <a:schemeClr val="accent1"/>
-          </a:lnRef>
-          <a:fillRef idx="0">
-            <a:schemeClr val="accent1"/>
-          </a:fillRef>
-          <a:effectRef idx="0">
-            <a:schemeClr val="accent1"/>
-          </a:effectRef>
-          <a:fontRef idx="minor">
-            <a:schemeClr val="tx1"/>
-          </a:fontRef>
-        </p:style>
-      </p:cxnSp>
-      <p:cxnSp>
-        <p:nvCxnSpPr>
-          <p:cNvPr id="35" name="Straight Arrow Connector 34"/>
-          <p:cNvCxnSpPr>
-            <a:cxnSpLocks/>
-          </p:cNvCxnSpPr>
-          <p:nvPr/>
-        </p:nvCxnSpPr>
-        <p:spPr>
-          <a:xfrm>
-            <a:off x="967451" y="4082719"/>
-            <a:ext cx="2348067" cy="0"/>
-          </a:xfrm>
-          <a:prstGeom prst="straightConnector1">
-            <a:avLst/>
-          </a:prstGeom>
-          <a:ln w="19050">
-            <a:solidFill>
-              <a:srgbClr val="0070C0"/>
-            </a:solidFill>
-            <a:prstDash val="sysDash"/>
-            <a:headEnd type="arrow" w="med" len="med"/>
-            <a:tailEnd type="none" w="med" len="med"/>
-          </a:ln>
-        </p:spPr>
-        <p:style>
-          <a:lnRef idx="1">
-            <a:schemeClr val="accent1"/>
-          </a:lnRef>
-          <a:fillRef idx="0">
-            <a:schemeClr val="accent1"/>
-          </a:fillRef>
-          <a:effectRef idx="0">
-            <a:schemeClr val="accent1"/>
-          </a:effectRef>
-          <a:fontRef idx="minor">
-            <a:schemeClr val="tx1"/>
-          </a:fontRef>
-        </p:style>
-      </p:cxnSp>
-      <p:cxnSp>
-        <p:nvCxnSpPr>
-          <p:cNvPr id="37" name="Straight Arrow Connector 36"/>
-          <p:cNvCxnSpPr/>
-          <p:nvPr/>
-        </p:nvCxnSpPr>
-        <p:spPr>
-          <a:xfrm>
-            <a:off x="-289991" y="6031523"/>
-            <a:ext cx="1196051" cy="0"/>
-          </a:xfrm>
-          <a:prstGeom prst="straightConnector1">
-            <a:avLst/>
-          </a:prstGeom>
-          <a:ln w="19050">
-            <a:solidFill>
-              <a:schemeClr val="accent1"/>
-            </a:solidFill>
-            <a:prstDash val="sysDash"/>
-            <a:headEnd type="arrow" w="med" len="med"/>
-            <a:tailEnd type="none" w="med" len="med"/>
-          </a:ln>
-        </p:spPr>
-        <p:style>
-          <a:lnRef idx="1">
-            <a:schemeClr val="accent1"/>
-          </a:lnRef>
-          <a:fillRef idx="0">
-            <a:schemeClr val="accent1"/>
-          </a:fillRef>
-          <a:effectRef idx="0">
-            <a:schemeClr val="accent1"/>
-          </a:effectRef>
-          <a:fontRef idx="minor">
-            <a:schemeClr val="tx1"/>
-          </a:fontRef>
-        </p:style>
-      </p:cxnSp>
-      <p:sp>
-        <p:nvSpPr>
-          <p:cNvPr id="80" name="TextBox 79"/>
+              <a:rPr lang="en-US" sz="1100" dirty="0" err="1"/>
+              <a:t>parseCommand</a:t>
+            </a:r>
+            <a:r>
+              <a:rPr lang="en-US" sz="1100" dirty="0"/>
+              <a:t>(“import </a:t>
+            </a:r>
+            <a:r>
+              <a:rPr lang="en-US" sz="1100" dirty="0" err="1"/>
+              <a:t>ark_save</a:t>
+            </a:r>
+            <a:r>
+              <a:rPr lang="en-US" sz="1100" dirty="0"/>
+              <a:t>”)</a:t>
+            </a:r>
+          </a:p>
+        </p:txBody>
+      </p:sp>
+      <p:sp>
+        <p:nvSpPr>
+          <p:cNvPr id="83" name="TextBox 82"/>
           <p:cNvSpPr txBox="1"/>
           <p:nvPr/>
         </p:nvSpPr>
         <p:spPr>
           <a:xfrm>
-            <a:off x="1161289" y="1182350"/>
-            <a:ext cx="1899551" cy="184666"/>
+            <a:off x="-240168" y="5748923"/>
+            <a:ext cx="762000" cy="215444"/>
           </a:xfrm>
           <a:prstGeom prst="rect">
             <a:avLst/>
@@ -4315,26 +4431,22 @@
           </a:lstStyle>
           <a:p>
             <a:r>
-              <a:rPr lang="en-US" sz="1200" dirty="0" err="1"/>
-              <a:t>parseCommand</a:t>
-            </a:r>
-            <a:r>
-              <a:rPr lang="en-US" sz="1200" dirty="0"/>
-              <a:t>(“import”)</a:t>
-            </a:r>
-          </a:p>
-        </p:txBody>
-      </p:sp>
-      <p:sp>
-        <p:nvSpPr>
-          <p:cNvPr id="82" name="TextBox 81"/>
+              <a:rPr lang="en-US" dirty="0"/>
+              <a:t>result</a:t>
+            </a:r>
+          </a:p>
+        </p:txBody>
+      </p:sp>
+      <p:sp>
+        <p:nvSpPr>
+          <p:cNvPr id="93" name="TextBox 92"/>
           <p:cNvSpPr txBox="1"/>
           <p:nvPr/>
         </p:nvSpPr>
         <p:spPr>
           <a:xfrm>
-            <a:off x="5301561" y="3667458"/>
-            <a:ext cx="621216" cy="215444"/>
+            <a:off x="4351836" y="1793054"/>
+            <a:ext cx="168081" cy="169277"/>
           </a:xfrm>
           <a:prstGeom prst="rect">
             <a:avLst/>
@@ -4359,88 +4471,8 @@
           </a:lstStyle>
           <a:p>
             <a:r>
-              <a:rPr lang="en-US" dirty="0"/>
-              <a:t>c</a:t>
-            </a:r>
-          </a:p>
-        </p:txBody>
-      </p:sp>
-      <p:sp>
-        <p:nvSpPr>
-          <p:cNvPr id="83" name="TextBox 82"/>
-          <p:cNvSpPr txBox="1"/>
-          <p:nvPr/>
-        </p:nvSpPr>
-        <p:spPr>
-          <a:xfrm>
-            <a:off x="-240168" y="5748923"/>
-            <a:ext cx="762000" cy="215444"/>
-          </a:xfrm>
-          <a:prstGeom prst="rect">
-            <a:avLst/>
-          </a:prstGeom>
-          <a:noFill/>
-        </p:spPr>
-        <p:txBody>
-          <a:bodyPr wrap="square" lIns="0" tIns="0" rIns="0" bIns="0" rtlCol="0">
-            <a:spAutoFit/>
-          </a:bodyPr>
-          <a:lstStyle>
-            <a:defPPr>
-              <a:defRPr lang="en-US"/>
-            </a:defPPr>
-            <a:lvl1pPr algn="r">
-              <a:defRPr sz="1400">
-                <a:solidFill>
-                  <a:srgbClr val="0070C0"/>
-                </a:solidFill>
-              </a:defRPr>
-            </a:lvl1pPr>
-          </a:lstStyle>
-          <a:p>
-            <a:r>
-              <a:rPr lang="en-US" dirty="0"/>
-              <a:t>result</a:t>
-            </a:r>
-          </a:p>
-        </p:txBody>
-      </p:sp>
-      <p:sp>
-        <p:nvSpPr>
-          <p:cNvPr id="93" name="TextBox 92"/>
-          <p:cNvSpPr txBox="1"/>
-          <p:nvPr/>
-        </p:nvSpPr>
-        <p:spPr>
-          <a:xfrm>
-            <a:off x="4065252" y="3887213"/>
-            <a:ext cx="220343" cy="215444"/>
-          </a:xfrm>
-          <a:prstGeom prst="rect">
-            <a:avLst/>
-          </a:prstGeom>
-          <a:noFill/>
-        </p:spPr>
-        <p:txBody>
-          <a:bodyPr wrap="square" lIns="0" tIns="0" rIns="0" bIns="0" rtlCol="0">
-            <a:spAutoFit/>
-          </a:bodyPr>
-          <a:lstStyle>
-            <a:defPPr>
-              <a:defRPr lang="en-US"/>
-            </a:defPPr>
-            <a:lvl1pPr algn="r">
-              <a:defRPr sz="1400">
-                <a:solidFill>
-                  <a:srgbClr val="0070C0"/>
-                </a:solidFill>
-              </a:defRPr>
-            </a:lvl1pPr>
-          </a:lstStyle>
-          <a:p>
-            <a:r>
-              <a:rPr lang="en-US" dirty="0"/>
-              <a:t>c</a:t>
+              <a:rPr lang="en-US" sz="1100" dirty="0"/>
+              <a:t>p</a:t>
             </a:r>
           </a:p>
         </p:txBody>
@@ -4486,8 +4518,8 @@
         </p:nvSpPr>
         <p:spPr>
           <a:xfrm>
-            <a:off x="4298406" y="1362599"/>
-            <a:ext cx="1816572" cy="335622"/>
+            <a:off x="4950426" y="1469291"/>
+            <a:ext cx="1759736" cy="254515"/>
           </a:xfrm>
           <a:prstGeom prst="rect">
             <a:avLst/>
@@ -4548,13 +4580,14 @@
           </p:cNvPr>
           <p:cNvCxnSpPr>
             <a:cxnSpLocks/>
+            <a:endCxn id="92" idx="1"/>
           </p:cNvCxnSpPr>
           <p:nvPr/>
         </p:nvCxnSpPr>
         <p:spPr>
-          <a:xfrm flipV="1">
-            <a:off x="834543" y="4281231"/>
-            <a:ext cx="5782398" cy="13942"/>
+          <a:xfrm>
+            <a:off x="5932062" y="4531308"/>
+            <a:ext cx="2051478" cy="0"/>
           </a:xfrm>
           <a:prstGeom prst="straightConnector1">
             <a:avLst/>
@@ -4597,8 +4630,8 @@
         </p:nvCxnSpPr>
         <p:spPr>
           <a:xfrm>
-            <a:off x="984345" y="1440118"/>
-            <a:ext cx="2256705" cy="1"/>
+            <a:off x="1009377" y="1469292"/>
+            <a:ext cx="2230148" cy="1"/>
           </a:xfrm>
           <a:prstGeom prst="straightConnector1">
             <a:avLst/>
@@ -4641,8 +4674,8 @@
         </p:nvCxnSpPr>
         <p:spPr>
           <a:xfrm>
-            <a:off x="5048231" y="1804848"/>
-            <a:ext cx="2342447" cy="18601"/>
+            <a:off x="5829421" y="2480782"/>
+            <a:ext cx="2479953" cy="0"/>
           </a:xfrm>
           <a:prstGeom prst="straightConnector1">
             <a:avLst/>
@@ -4685,8 +4718,8 @@
         </p:nvCxnSpPr>
         <p:spPr>
           <a:xfrm>
-            <a:off x="7462096" y="1063158"/>
-            <a:ext cx="44035" cy="4575642"/>
+            <a:off x="8418071" y="2200935"/>
+            <a:ext cx="0" cy="814793"/>
           </a:xfrm>
           <a:prstGeom prst="line">
             <a:avLst/>
@@ -4728,8 +4761,8 @@
         </p:nvSpPr>
         <p:spPr>
           <a:xfrm>
-            <a:off x="6967220" y="941023"/>
-            <a:ext cx="993239" cy="335622"/>
+            <a:off x="7896805" y="1977275"/>
+            <a:ext cx="993239" cy="257148"/>
           </a:xfrm>
           <a:prstGeom prst="rect">
             <a:avLst/>
@@ -4764,7 +4797,7 @@
           <a:p>
             <a:pPr algn="ctr"/>
             <a:r>
-              <a:rPr lang="en-US" sz="1200" dirty="0">
+              <a:rPr lang="en-US" sz="1100" dirty="0">
                 <a:solidFill>
                   <a:schemeClr val="bg1"/>
                 </a:solidFill>
@@ -4772,73 +4805,16 @@
               <a:t>:</a:t>
             </a:r>
             <a:r>
-              <a:rPr lang="en-US" sz="1200" dirty="0" err="1">
+              <a:rPr lang="en-US" sz="1100" dirty="0" err="1">
                 <a:solidFill>
                   <a:schemeClr val="bg1"/>
                 </a:solidFill>
               </a:rPr>
               <a:t>ParserUtil</a:t>
             </a:r>
-            <a:endParaRPr lang="en-SG" sz="1200" dirty="0">
+            <a:endParaRPr lang="en-SG" sz="1100" dirty="0">
               <a:solidFill>
                 <a:schemeClr val="bg1"/>
-              </a:solidFill>
-            </a:endParaRPr>
-          </a:p>
-        </p:txBody>
-      </p:sp>
-      <p:sp>
-        <p:nvSpPr>
-          <p:cNvPr id="53" name="Rectangle 52">
-            <a:extLst>
-              <a:ext uri="{FF2B5EF4-FFF2-40B4-BE49-F238E27FC236}">
-                <a16:creationId xmlns:a16="http://schemas.microsoft.com/office/drawing/2014/main" id="{F4B1C2C7-60A3-4E50-9916-3752E95D19D2}"/>
-              </a:ext>
-            </a:extLst>
-          </p:cNvPr>
-          <p:cNvSpPr/>
-          <p:nvPr/>
-        </p:nvSpPr>
-        <p:spPr>
-          <a:xfrm>
-            <a:off x="7390678" y="1776051"/>
-            <a:ext cx="139989" cy="841259"/>
-          </a:xfrm>
-          <a:prstGeom prst="rect">
-            <a:avLst/>
-          </a:prstGeom>
-          <a:solidFill>
-            <a:srgbClr val="0070C0"/>
-          </a:solidFill>
-          <a:ln>
-            <a:solidFill>
-              <a:srgbClr val="0070C0"/>
-            </a:solidFill>
-          </a:ln>
-          <a:effectLst/>
-        </p:spPr>
-        <p:style>
-          <a:lnRef idx="1">
-            <a:schemeClr val="accent3"/>
-          </a:lnRef>
-          <a:fillRef idx="2">
-            <a:schemeClr val="accent3"/>
-          </a:fillRef>
-          <a:effectRef idx="1">
-            <a:schemeClr val="accent3"/>
-          </a:effectRef>
-          <a:fontRef idx="minor">
-            <a:schemeClr val="dk1"/>
-          </a:fontRef>
-        </p:style>
-        <p:txBody>
-          <a:bodyPr rtlCol="0" anchor="ctr"/>
-          <a:lstStyle/>
-          <a:p>
-            <a:pPr algn="ctr"/>
-            <a:endParaRPr lang="en-SG" sz="1400">
-              <a:solidFill>
-                <a:schemeClr val="dk1"/>
               </a:solidFill>
             </a:endParaRPr>
           </a:p>
@@ -4855,14 +4831,13 @@
           </p:cNvPr>
           <p:cNvCxnSpPr>
             <a:cxnSpLocks/>
-            <a:endCxn id="53" idx="2"/>
           </p:cNvCxnSpPr>
           <p:nvPr/>
         </p:nvCxnSpPr>
         <p:spPr>
-          <a:xfrm flipV="1">
-            <a:off x="5078801" y="2617310"/>
-            <a:ext cx="2381872" cy="2372"/>
+          <a:xfrm>
+            <a:off x="5899672" y="4919998"/>
+            <a:ext cx="2863328" cy="10259"/>
           </a:xfrm>
           <a:prstGeom prst="straightConnector1">
             <a:avLst/>
@@ -4891,109 +4866,6 @@
           </a:fontRef>
         </p:style>
       </p:cxnSp>
-      <p:sp>
-        <p:nvSpPr>
-          <p:cNvPr id="55" name="TextBox 54">
-            <a:extLst>
-              <a:ext uri="{FF2B5EF4-FFF2-40B4-BE49-F238E27FC236}">
-                <a16:creationId xmlns:a16="http://schemas.microsoft.com/office/drawing/2014/main" id="{D78E93C6-798A-4CF2-A3F8-435EDEC2CA02}"/>
-              </a:ext>
-            </a:extLst>
-          </p:cNvPr>
-          <p:cNvSpPr txBox="1"/>
-          <p:nvPr/>
-        </p:nvSpPr>
-        <p:spPr>
-          <a:xfrm>
-            <a:off x="4481190" y="1816173"/>
-            <a:ext cx="1899551" cy="184666"/>
-          </a:xfrm>
-          <a:prstGeom prst="rect">
-            <a:avLst/>
-          </a:prstGeom>
-          <a:noFill/>
-        </p:spPr>
-        <p:txBody>
-          <a:bodyPr wrap="square" lIns="0" tIns="0" rIns="0" bIns="0" rtlCol="0">
-            <a:spAutoFit/>
-          </a:bodyPr>
-          <a:lstStyle>
-            <a:defPPr>
-              <a:defRPr lang="en-US"/>
-            </a:defPPr>
-            <a:lvl1pPr algn="r">
-              <a:defRPr sz="1400">
-                <a:solidFill>
-                  <a:srgbClr val="0070C0"/>
-                </a:solidFill>
-              </a:defRPr>
-            </a:lvl1pPr>
-          </a:lstStyle>
-          <a:p>
-            <a:r>
-              <a:rPr lang="en-US" sz="1200" dirty="0"/>
-              <a:t>parse(arguments)</a:t>
-            </a:r>
-          </a:p>
-        </p:txBody>
-      </p:sp>
-      <p:sp>
-        <p:nvSpPr>
-          <p:cNvPr id="62" name="Rectangle 61">
-            <a:extLst>
-              <a:ext uri="{FF2B5EF4-FFF2-40B4-BE49-F238E27FC236}">
-                <a16:creationId xmlns:a16="http://schemas.microsoft.com/office/drawing/2014/main" id="{E4BB2C8F-92EF-4F83-B008-ACFEA5FC80FC}"/>
-              </a:ext>
-            </a:extLst>
-          </p:cNvPr>
-          <p:cNvSpPr/>
-          <p:nvPr/>
-        </p:nvSpPr>
-        <p:spPr>
-          <a:xfrm>
-            <a:off x="7467061" y="1925389"/>
-            <a:ext cx="157971" cy="522363"/>
-          </a:xfrm>
-          <a:prstGeom prst="rect">
-            <a:avLst/>
-          </a:prstGeom>
-          <a:solidFill>
-            <a:srgbClr val="0070C0"/>
-          </a:solidFill>
-          <a:ln>
-            <a:solidFill>
-              <a:schemeClr val="tx2"/>
-            </a:solidFill>
-          </a:ln>
-          <a:effectLst/>
-        </p:spPr>
-        <p:style>
-          <a:lnRef idx="1">
-            <a:schemeClr val="accent3"/>
-          </a:lnRef>
-          <a:fillRef idx="2">
-            <a:schemeClr val="accent3"/>
-          </a:fillRef>
-          <a:effectRef idx="1">
-            <a:schemeClr val="accent3"/>
-          </a:effectRef>
-          <a:fontRef idx="minor">
-            <a:schemeClr val="dk1"/>
-          </a:fontRef>
-        </p:style>
-        <p:txBody>
-          <a:bodyPr rtlCol="0" anchor="ctr"/>
-          <a:lstStyle/>
-          <a:p>
-            <a:pPr algn="ctr"/>
-            <a:endParaRPr lang="en-SG" sz="1400">
-              <a:solidFill>
-                <a:schemeClr val="dk1"/>
-              </a:solidFill>
-            </a:endParaRPr>
-          </a:p>
-        </p:txBody>
-      </p:sp>
       <p:cxnSp>
         <p:nvCxnSpPr>
           <p:cNvPr id="32" name="Connector: Curved 31">
@@ -5010,7 +4882,7 @@
         </p:nvCxnSpPr>
         <p:spPr>
           <a:xfrm>
-            <a:off x="7484462" y="1823449"/>
+            <a:off x="7575842" y="602385"/>
             <a:ext cx="121666" cy="87835"/>
           </a:xfrm>
           <a:prstGeom prst="curvedConnector3">
@@ -5053,7 +4925,7 @@
         </p:nvCxnSpPr>
         <p:spPr>
           <a:xfrm rot="10800000" flipV="1">
-            <a:off x="7534491" y="2453038"/>
+            <a:off x="7784303" y="853553"/>
             <a:ext cx="153325" cy="65805"/>
           </a:xfrm>
           <a:prstGeom prst="curvedConnector3">
@@ -5095,8 +4967,8 @@
         </p:nvSpPr>
         <p:spPr>
           <a:xfrm>
-            <a:off x="6820951" y="1620869"/>
-            <a:ext cx="2850495" cy="184666"/>
+            <a:off x="5886794" y="2257065"/>
+            <a:ext cx="2205195" cy="169277"/>
           </a:xfrm>
           <a:prstGeom prst="rect">
             <a:avLst/>
@@ -5121,12 +4993,12 @@
           </a:lstStyle>
           <a:p>
             <a:r>
-              <a:rPr lang="en-US" sz="1200" dirty="0" err="1"/>
+              <a:rPr lang="en-US" sz="1100" dirty="0" err="1"/>
               <a:t>parseImportFilePath</a:t>
             </a:r>
             <a:r>
-              <a:rPr lang="en-US" sz="1200" dirty="0"/>
-              <a:t>(arguments)</a:t>
+              <a:rPr lang="en-US" sz="1100" dirty="0"/>
+              <a:t>(“ark_save.xml”)</a:t>
             </a:r>
           </a:p>
         </p:txBody>
@@ -5145,8 +5017,8 @@
         </p:nvSpPr>
         <p:spPr>
           <a:xfrm>
-            <a:off x="3721329" y="2402551"/>
-            <a:ext cx="2850495" cy="184666"/>
+            <a:off x="6214130" y="2739929"/>
+            <a:ext cx="1348588" cy="169277"/>
           </a:xfrm>
           <a:prstGeom prst="rect">
             <a:avLst/>
@@ -5171,10 +5043,10 @@
           </a:lstStyle>
           <a:p>
             <a:r>
-              <a:rPr lang="en-US" sz="1200" dirty="0" err="1"/>
+              <a:rPr lang="en-US" sz="1100" dirty="0" err="1"/>
               <a:t>readOnlyAddressBook</a:t>
             </a:r>
-            <a:endParaRPr lang="en-US" sz="1200" dirty="0"/>
+            <a:endParaRPr lang="en-US" sz="1100" dirty="0"/>
           </a:p>
         </p:txBody>
       </p:sp>
@@ -5192,8 +5064,8 @@
         </p:nvSpPr>
         <p:spPr>
           <a:xfrm>
-            <a:off x="6581547" y="2913416"/>
-            <a:ext cx="200254" cy="762013"/>
+            <a:off x="5686102" y="2368674"/>
+            <a:ext cx="207045" cy="2653788"/>
           </a:xfrm>
           <a:prstGeom prst="rect">
             <a:avLst/>
@@ -5203,7 +5075,9 @@
           </a:solidFill>
           <a:ln>
             <a:solidFill>
-              <a:srgbClr val="0070C0"/>
+              <a:schemeClr val="accent1">
+                <a:lumMod val="50000"/>
+              </a:schemeClr>
             </a:solidFill>
           </a:ln>
           <a:effectLst/>
@@ -5246,13 +5120,14 @@
           </p:cNvPr>
           <p:cNvCxnSpPr>
             <a:cxnSpLocks/>
+            <a:stCxn id="118" idx="2"/>
           </p:cNvCxnSpPr>
           <p:nvPr/>
         </p:nvCxnSpPr>
         <p:spPr>
           <a:xfrm>
-            <a:off x="6701904" y="2913816"/>
-            <a:ext cx="38999" cy="2919746"/>
+            <a:off x="8740157" y="4919998"/>
+            <a:ext cx="22843" cy="1044369"/>
           </a:xfrm>
           <a:prstGeom prst="line">
             <a:avLst/>
@@ -5280,71 +5155,6 @@
           </a:fontRef>
         </p:style>
       </p:cxnSp>
-      <p:sp>
-        <p:nvSpPr>
-          <p:cNvPr id="96" name="Rectangle 62">
-            <a:extLst>
-              <a:ext uri="{FF2B5EF4-FFF2-40B4-BE49-F238E27FC236}">
-                <a16:creationId xmlns:a16="http://schemas.microsoft.com/office/drawing/2014/main" id="{04D2FF09-5648-4A2B-BE56-D44DDB223438}"/>
-              </a:ext>
-            </a:extLst>
-          </p:cNvPr>
-          <p:cNvSpPr/>
-          <p:nvPr/>
-        </p:nvSpPr>
-        <p:spPr>
-          <a:xfrm>
-            <a:off x="5856213" y="2883734"/>
-            <a:ext cx="1458987" cy="335622"/>
-          </a:xfrm>
-          <a:prstGeom prst="rect">
-            <a:avLst/>
-          </a:prstGeom>
-          <a:solidFill>
-            <a:srgbClr val="0070C0"/>
-          </a:solidFill>
-          <a:ln w="19050">
-            <a:solidFill>
-              <a:srgbClr val="0070C0"/>
-            </a:solidFill>
-          </a:ln>
-          <a:effectLst/>
-        </p:spPr>
-        <p:style>
-          <a:lnRef idx="1">
-            <a:schemeClr val="accent2"/>
-          </a:lnRef>
-          <a:fillRef idx="2">
-            <a:schemeClr val="accent2"/>
-          </a:fillRef>
-          <a:effectRef idx="1">
-            <a:schemeClr val="accent2"/>
-          </a:effectRef>
-          <a:fontRef idx="minor">
-            <a:schemeClr val="dk1"/>
-          </a:fontRef>
-        </p:style>
-        <p:txBody>
-          <a:bodyPr rtlCol="0" anchor="ctr"/>
-          <a:lstStyle/>
-          <a:p>
-            <a:pPr algn="ctr"/>
-            <a:r>
-              <a:rPr lang="en-US" sz="1200" dirty="0">
-                <a:solidFill>
-                  <a:schemeClr val="bg1"/>
-                </a:solidFill>
-              </a:rPr>
-              <a:t>c:ImportCommand</a:t>
-            </a:r>
-            <a:endParaRPr lang="en-SG" sz="1200" dirty="0">
-              <a:solidFill>
-                <a:schemeClr val="bg1"/>
-              </a:solidFill>
-            </a:endParaRPr>
-          </a:p>
-        </p:txBody>
-      </p:sp>
       <p:cxnSp>
         <p:nvCxnSpPr>
           <p:cNvPr id="101" name="Straight Arrow Connector 100">
@@ -5354,13 +5164,15 @@
               </a:ext>
             </a:extLst>
           </p:cNvPr>
-          <p:cNvCxnSpPr/>
+          <p:cNvCxnSpPr>
+            <a:cxnSpLocks/>
+          </p:cNvCxnSpPr>
           <p:nvPr/>
         </p:nvCxnSpPr>
         <p:spPr>
           <a:xfrm flipV="1">
-            <a:off x="4962830" y="3075112"/>
-            <a:ext cx="922392" cy="1"/>
+            <a:off x="5932062" y="3646009"/>
+            <a:ext cx="1940912" cy="1008"/>
           </a:xfrm>
           <a:prstGeom prst="straightConnector1">
             <a:avLst/>
@@ -5398,13 +5210,14 @@
           </p:cNvPr>
           <p:cNvCxnSpPr>
             <a:cxnSpLocks/>
+            <a:endCxn id="111" idx="2"/>
           </p:cNvCxnSpPr>
           <p:nvPr/>
         </p:nvCxnSpPr>
         <p:spPr>
           <a:xfrm>
-            <a:off x="5110050" y="3675429"/>
-            <a:ext cx="1552767" cy="0"/>
+            <a:off x="5893147" y="2939348"/>
+            <a:ext cx="2518399" cy="7007"/>
           </a:xfrm>
           <a:prstGeom prst="straightConnector1">
             <a:avLst/>
@@ -5449,8 +5262,8 @@
         </p:nvCxnSpPr>
         <p:spPr>
           <a:xfrm>
-            <a:off x="984343" y="5483469"/>
-            <a:ext cx="5714817" cy="0"/>
+            <a:off x="3418245" y="4998696"/>
+            <a:ext cx="2351222" cy="23766"/>
           </a:xfrm>
           <a:prstGeom prst="straightConnector1">
             <a:avLst/>
@@ -5493,8 +5306,8 @@
         </p:nvSpPr>
         <p:spPr>
           <a:xfrm>
-            <a:off x="2181082" y="3851104"/>
-            <a:ext cx="220343" cy="215444"/>
+            <a:off x="1852905" y="4930129"/>
+            <a:ext cx="170999" cy="184666"/>
           </a:xfrm>
           <a:prstGeom prst="rect">
             <a:avLst/>
@@ -5519,7 +5332,7 @@
           </a:lstStyle>
           <a:p>
             <a:r>
-              <a:rPr lang="en-US" dirty="0"/>
+              <a:rPr lang="en-US" sz="1200" dirty="0"/>
               <a:t>c</a:t>
             </a:r>
           </a:p>
@@ -5539,8 +5352,8 @@
         </p:nvSpPr>
         <p:spPr>
           <a:xfrm>
-            <a:off x="6601776" y="4222113"/>
-            <a:ext cx="249077" cy="1264287"/>
+            <a:off x="8305942" y="2466402"/>
+            <a:ext cx="211208" cy="479953"/>
           </a:xfrm>
           <a:prstGeom prst="rect">
             <a:avLst/>
@@ -5596,8 +5409,8 @@
         </p:nvSpPr>
         <p:spPr>
           <a:xfrm>
-            <a:off x="7414504" y="4320274"/>
-            <a:ext cx="210528" cy="941150"/>
+            <a:off x="8634893" y="4463685"/>
+            <a:ext cx="210528" cy="456313"/>
           </a:xfrm>
           <a:prstGeom prst="rect">
             <a:avLst/>
@@ -5655,8 +5468,8 @@
         </p:nvCxnSpPr>
         <p:spPr>
           <a:xfrm>
-            <a:off x="6856180" y="4314992"/>
-            <a:ext cx="564354" cy="207"/>
+            <a:off x="923379" y="5403154"/>
+            <a:ext cx="7839621" cy="10034"/>
           </a:xfrm>
           <a:prstGeom prst="straightConnector1">
             <a:avLst/>
@@ -5685,150 +5498,6 @@
       </p:cxnSp>
       <p:sp>
         <p:nvSpPr>
-          <p:cNvPr id="125" name="Rectangle 124">
-            <a:extLst>
-              <a:ext uri="{FF2B5EF4-FFF2-40B4-BE49-F238E27FC236}">
-                <a16:creationId xmlns:a16="http://schemas.microsoft.com/office/drawing/2014/main" id="{695D15CB-8221-4537-9BB0-25C324F9DBC3}"/>
-              </a:ext>
-            </a:extLst>
-          </p:cNvPr>
-          <p:cNvSpPr/>
-          <p:nvPr/>
-        </p:nvSpPr>
-        <p:spPr>
-          <a:xfrm>
-            <a:off x="7550121" y="4540291"/>
-            <a:ext cx="157971" cy="522363"/>
-          </a:xfrm>
-          <a:prstGeom prst="rect">
-            <a:avLst/>
-          </a:prstGeom>
-          <a:solidFill>
-            <a:srgbClr val="0070C0"/>
-          </a:solidFill>
-          <a:ln>
-            <a:solidFill>
-              <a:schemeClr val="tx2"/>
-            </a:solidFill>
-          </a:ln>
-          <a:effectLst/>
-        </p:spPr>
-        <p:style>
-          <a:lnRef idx="1">
-            <a:schemeClr val="accent3"/>
-          </a:lnRef>
-          <a:fillRef idx="2">
-            <a:schemeClr val="accent3"/>
-          </a:fillRef>
-          <a:effectRef idx="1">
-            <a:schemeClr val="accent3"/>
-          </a:effectRef>
-          <a:fontRef idx="minor">
-            <a:schemeClr val="dk1"/>
-          </a:fontRef>
-        </p:style>
-        <p:txBody>
-          <a:bodyPr rtlCol="0" anchor="ctr"/>
-          <a:lstStyle/>
-          <a:p>
-            <a:pPr algn="ctr"/>
-            <a:endParaRPr lang="en-SG" sz="1400">
-              <a:solidFill>
-                <a:schemeClr val="dk1"/>
-              </a:solidFill>
-            </a:endParaRPr>
-          </a:p>
-        </p:txBody>
-      </p:sp>
-      <p:cxnSp>
-        <p:nvCxnSpPr>
-          <p:cNvPr id="126" name="Connector: Curved 125">
-            <a:extLst>
-              <a:ext uri="{FF2B5EF4-FFF2-40B4-BE49-F238E27FC236}">
-                <a16:creationId xmlns:a16="http://schemas.microsoft.com/office/drawing/2014/main" id="{AFDC5F4E-BDE5-4442-95B0-72FADBCD2278}"/>
-              </a:ext>
-            </a:extLst>
-          </p:cNvPr>
-          <p:cNvCxnSpPr>
-            <a:cxnSpLocks/>
-          </p:cNvCxnSpPr>
-          <p:nvPr/>
-        </p:nvCxnSpPr>
-        <p:spPr>
-          <a:xfrm>
-            <a:off x="7567522" y="4438351"/>
-            <a:ext cx="121666" cy="87835"/>
-          </a:xfrm>
-          <a:prstGeom prst="curvedConnector3">
-            <a:avLst>
-              <a:gd name="adj1" fmla="val 287891"/>
-            </a:avLst>
-          </a:prstGeom>
-          <a:ln>
-            <a:tailEnd type="triangle"/>
-          </a:ln>
-        </p:spPr>
-        <p:style>
-          <a:lnRef idx="1">
-            <a:schemeClr val="accent1"/>
-          </a:lnRef>
-          <a:fillRef idx="0">
-            <a:schemeClr val="accent1"/>
-          </a:fillRef>
-          <a:effectRef idx="0">
-            <a:schemeClr val="accent1"/>
-          </a:effectRef>
-          <a:fontRef idx="minor">
-            <a:schemeClr val="tx1"/>
-          </a:fontRef>
-        </p:style>
-      </p:cxnSp>
-      <p:cxnSp>
-        <p:nvCxnSpPr>
-          <p:cNvPr id="127" name="Connector: Curved 126">
-            <a:extLst>
-              <a:ext uri="{FF2B5EF4-FFF2-40B4-BE49-F238E27FC236}">
-                <a16:creationId xmlns:a16="http://schemas.microsoft.com/office/drawing/2014/main" id="{0850B6CA-9C4C-4095-981D-C585CE76DB71}"/>
-              </a:ext>
-            </a:extLst>
-          </p:cNvPr>
-          <p:cNvCxnSpPr>
-            <a:cxnSpLocks/>
-          </p:cNvCxnSpPr>
-          <p:nvPr/>
-        </p:nvCxnSpPr>
-        <p:spPr>
-          <a:xfrm rot="10800000" flipV="1">
-            <a:off x="7617551" y="5067940"/>
-            <a:ext cx="153325" cy="65805"/>
-          </a:xfrm>
-          <a:prstGeom prst="curvedConnector3">
-            <a:avLst>
-              <a:gd name="adj1" fmla="val -144970"/>
-            </a:avLst>
-          </a:prstGeom>
-          <a:ln>
-            <a:prstDash val="dash"/>
-            <a:tailEnd type="triangle"/>
-          </a:ln>
-        </p:spPr>
-        <p:style>
-          <a:lnRef idx="1">
-            <a:schemeClr val="accent1"/>
-          </a:lnRef>
-          <a:fillRef idx="0">
-            <a:schemeClr val="accent1"/>
-          </a:fillRef>
-          <a:effectRef idx="0">
-            <a:schemeClr val="accent1"/>
-          </a:effectRef>
-          <a:fontRef idx="minor">
-            <a:schemeClr val="tx1"/>
-          </a:fontRef>
-        </p:style>
-      </p:cxnSp>
-      <p:sp>
-        <p:nvSpPr>
           <p:cNvPr id="128" name="TextBox 127">
             <a:extLst>
               <a:ext uri="{FF2B5EF4-FFF2-40B4-BE49-F238E27FC236}">
@@ -5841,8 +5510,8 @@
         </p:nvSpPr>
         <p:spPr>
           <a:xfrm>
-            <a:off x="7070939" y="4199754"/>
-            <a:ext cx="1625553" cy="191611"/>
+            <a:off x="5628915" y="3947540"/>
+            <a:ext cx="2130522" cy="169277"/>
           </a:xfrm>
           <a:prstGeom prst="rect">
             <a:avLst/>
@@ -5867,62 +5536,24 @@
           </a:lstStyle>
           <a:p>
             <a:r>
-              <a:rPr lang="en-US" sz="1200" dirty="0" err="1"/>
-              <a:t>allAllParcels</a:t>
-            </a:r>
-            <a:r>
-              <a:rPr lang="en-US" sz="1200" dirty="0"/>
-              <a:t>()</a:t>
-            </a:r>
-          </a:p>
-        </p:txBody>
-      </p:sp>
-      <p:cxnSp>
-        <p:nvCxnSpPr>
-          <p:cNvPr id="131" name="Straight Arrow Connector 130">
-            <a:extLst>
-              <a:ext uri="{FF2B5EF4-FFF2-40B4-BE49-F238E27FC236}">
-                <a16:creationId xmlns:a16="http://schemas.microsoft.com/office/drawing/2014/main" id="{929DE690-5173-46E2-8AB9-198136BEC865}"/>
-              </a:ext>
-            </a:extLst>
-          </p:cNvPr>
-          <p:cNvCxnSpPr>
-            <a:cxnSpLocks/>
-          </p:cNvCxnSpPr>
-          <p:nvPr/>
-        </p:nvCxnSpPr>
-        <p:spPr>
-          <a:xfrm>
-            <a:off x="6850853" y="5261424"/>
-            <a:ext cx="668915" cy="0"/>
-          </a:xfrm>
-          <a:prstGeom prst="straightConnector1">
-            <a:avLst/>
-          </a:prstGeom>
-          <a:ln w="19050">
-            <a:solidFill>
-              <a:srgbClr val="0070C0"/>
-            </a:solidFill>
-            <a:prstDash val="sysDash"/>
-            <a:headEnd type="arrow" w="med" len="med"/>
-            <a:tailEnd type="none" w="med" len="med"/>
-          </a:ln>
-        </p:spPr>
-        <p:style>
-          <a:lnRef idx="1">
-            <a:schemeClr val="accent1"/>
-          </a:lnRef>
-          <a:fillRef idx="0">
-            <a:schemeClr val="accent1"/>
-          </a:fillRef>
-          <a:effectRef idx="0">
-            <a:schemeClr val="accent1"/>
-          </a:effectRef>
-          <a:fontRef idx="minor">
-            <a:schemeClr val="tx1"/>
-          </a:fontRef>
-        </p:style>
-      </p:cxnSp>
+              <a:rPr lang="en-US" sz="1100" dirty="0" err="1"/>
+              <a:t>parcels:List</a:t>
+            </a:r>
+            <a:r>
+              <a:rPr lang="en-US" sz="1100" dirty="0"/>
+              <a:t>&lt;</a:t>
+            </a:r>
+            <a:r>
+              <a:rPr lang="en-US" sz="1100" dirty="0" err="1"/>
+              <a:t>ReadOnlyParcel</a:t>
+            </a:r>
+            <a:r>
+              <a:rPr lang="en-US" sz="1100" dirty="0"/>
+              <a:t>&gt;</a:t>
+            </a:r>
+          </a:p>
+        </p:txBody>
+      </p:sp>
       <p:sp>
         <p:nvSpPr>
           <p:cNvPr id="135" name="TextBox 134">
@@ -5937,8 +5568,8 @@
         </p:nvSpPr>
         <p:spPr>
           <a:xfrm>
-            <a:off x="6616941" y="5702757"/>
-            <a:ext cx="258404" cy="261610"/>
+            <a:off x="7860965" y="4150158"/>
+            <a:ext cx="251643" cy="261610"/>
           </a:xfrm>
           <a:prstGeom prst="rect">
             <a:avLst/>
@@ -5946,7 +5577,7 @@
           <a:noFill/>
         </p:spPr>
         <p:txBody>
-          <a:bodyPr wrap="none" rtlCol="0">
+          <a:bodyPr wrap="square" rtlCol="0">
             <a:spAutoFit/>
           </a:bodyPr>
           <a:lstStyle/>
@@ -6007,6 +5638,852 @@
           </a:fontRef>
         </p:style>
       </p:cxnSp>
+      <p:sp>
+        <p:nvSpPr>
+          <p:cNvPr id="64" name="TextBox 63">
+            <a:extLst>
+              <a:ext uri="{FF2B5EF4-FFF2-40B4-BE49-F238E27FC236}">
+                <a16:creationId xmlns:a16="http://schemas.microsoft.com/office/drawing/2014/main" id="{2D37FA9E-4537-475E-B058-03D5725EBB7E}"/>
+              </a:ext>
+            </a:extLst>
+          </p:cNvPr>
+          <p:cNvSpPr txBox="1"/>
+          <p:nvPr/>
+        </p:nvSpPr>
+        <p:spPr>
+          <a:xfrm>
+            <a:off x="3483346" y="1356626"/>
+            <a:ext cx="1339032" cy="169277"/>
+          </a:xfrm>
+          <a:prstGeom prst="rect">
+            <a:avLst/>
+          </a:prstGeom>
+          <a:noFill/>
+        </p:spPr>
+        <p:txBody>
+          <a:bodyPr wrap="square" lIns="0" tIns="0" rIns="0" bIns="0" rtlCol="0">
+            <a:spAutoFit/>
+          </a:bodyPr>
+          <a:lstStyle>
+            <a:defPPr>
+              <a:defRPr lang="en-US"/>
+            </a:defPPr>
+            <a:lvl1pPr algn="r">
+              <a:defRPr sz="1400">
+                <a:solidFill>
+                  <a:srgbClr val="0070C0"/>
+                </a:solidFill>
+              </a:defRPr>
+            </a:lvl1pPr>
+          </a:lstStyle>
+          <a:p>
+            <a:r>
+              <a:rPr lang="en-US" sz="1100" dirty="0" err="1"/>
+              <a:t>ImportComandParser</a:t>
+            </a:r>
+            <a:r>
+              <a:rPr lang="en-US" sz="1100" dirty="0"/>
+              <a:t>()</a:t>
+            </a:r>
+          </a:p>
+        </p:txBody>
+      </p:sp>
+      <p:cxnSp>
+        <p:nvCxnSpPr>
+          <p:cNvPr id="68" name="Straight Arrow Connector 67">
+            <a:extLst>
+              <a:ext uri="{FF2B5EF4-FFF2-40B4-BE49-F238E27FC236}">
+                <a16:creationId xmlns:a16="http://schemas.microsoft.com/office/drawing/2014/main" id="{3047C105-E49A-4FE2-A7FB-EA926C9D585C}"/>
+              </a:ext>
+            </a:extLst>
+          </p:cNvPr>
+          <p:cNvCxnSpPr>
+            <a:cxnSpLocks/>
+          </p:cNvCxnSpPr>
+          <p:nvPr/>
+        </p:nvCxnSpPr>
+        <p:spPr>
+          <a:xfrm>
+            <a:off x="3473622" y="2379834"/>
+            <a:ext cx="2218835" cy="0"/>
+          </a:xfrm>
+          <a:prstGeom prst="straightConnector1">
+            <a:avLst/>
+          </a:prstGeom>
+          <a:ln w="19050">
+            <a:solidFill>
+              <a:srgbClr val="0070C0"/>
+            </a:solidFill>
+            <a:tailEnd type="arrow"/>
+          </a:ln>
+        </p:spPr>
+        <p:style>
+          <a:lnRef idx="1">
+            <a:schemeClr val="accent1"/>
+          </a:lnRef>
+          <a:fillRef idx="0">
+            <a:schemeClr val="accent1"/>
+          </a:fillRef>
+          <a:effectRef idx="0">
+            <a:schemeClr val="accent1"/>
+          </a:effectRef>
+          <a:fontRef idx="minor">
+            <a:schemeClr val="tx1"/>
+          </a:fontRef>
+        </p:style>
+      </p:cxnSp>
+      <p:sp>
+        <p:nvSpPr>
+          <p:cNvPr id="70" name="TextBox 69">
+            <a:extLst>
+              <a:ext uri="{FF2B5EF4-FFF2-40B4-BE49-F238E27FC236}">
+                <a16:creationId xmlns:a16="http://schemas.microsoft.com/office/drawing/2014/main" id="{DF683240-6163-44F4-88D7-C3AFB3CAF046}"/>
+              </a:ext>
+            </a:extLst>
+          </p:cNvPr>
+          <p:cNvSpPr txBox="1"/>
+          <p:nvPr/>
+        </p:nvSpPr>
+        <p:spPr>
+          <a:xfrm>
+            <a:off x="3733362" y="2175381"/>
+            <a:ext cx="1265085" cy="169277"/>
+          </a:xfrm>
+          <a:prstGeom prst="rect">
+            <a:avLst/>
+          </a:prstGeom>
+          <a:noFill/>
+        </p:spPr>
+        <p:txBody>
+          <a:bodyPr wrap="square" lIns="0" tIns="0" rIns="0" bIns="0" rtlCol="0">
+            <a:spAutoFit/>
+          </a:bodyPr>
+          <a:lstStyle>
+            <a:defPPr>
+              <a:defRPr lang="en-US"/>
+            </a:defPPr>
+            <a:lvl1pPr algn="r">
+              <a:defRPr sz="1400">
+                <a:solidFill>
+                  <a:srgbClr val="0070C0"/>
+                </a:solidFill>
+              </a:defRPr>
+            </a:lvl1pPr>
+          </a:lstStyle>
+          <a:p>
+            <a:r>
+              <a:rPr lang="en-US" sz="1100" dirty="0"/>
+              <a:t>parse(“</a:t>
+            </a:r>
+            <a:r>
+              <a:rPr lang="en-US" sz="1100" dirty="0" err="1"/>
+              <a:t>ark_save</a:t>
+            </a:r>
+            <a:r>
+              <a:rPr lang="en-US" sz="1100" dirty="0"/>
+              <a:t>”)</a:t>
+            </a:r>
+          </a:p>
+        </p:txBody>
+      </p:sp>
+      <p:sp>
+        <p:nvSpPr>
+          <p:cNvPr id="85" name="Rectangle 84">
+            <a:extLst>
+              <a:ext uri="{FF2B5EF4-FFF2-40B4-BE49-F238E27FC236}">
+                <a16:creationId xmlns:a16="http://schemas.microsoft.com/office/drawing/2014/main" id="{2DEC5D8F-E1DF-42CE-95DC-8E67EA15812D}"/>
+              </a:ext>
+            </a:extLst>
+          </p:cNvPr>
+          <p:cNvSpPr/>
+          <p:nvPr/>
+        </p:nvSpPr>
+        <p:spPr>
+          <a:xfrm>
+            <a:off x="7875246" y="3650915"/>
+            <a:ext cx="211208" cy="530713"/>
+          </a:xfrm>
+          <a:prstGeom prst="rect">
+            <a:avLst/>
+          </a:prstGeom>
+          <a:solidFill>
+            <a:srgbClr val="0070C0"/>
+          </a:solidFill>
+          <a:ln>
+            <a:solidFill>
+              <a:srgbClr val="0070C0"/>
+            </a:solidFill>
+          </a:ln>
+          <a:effectLst/>
+        </p:spPr>
+        <p:style>
+          <a:lnRef idx="1">
+            <a:schemeClr val="accent3"/>
+          </a:lnRef>
+          <a:fillRef idx="2">
+            <a:schemeClr val="accent3"/>
+          </a:fillRef>
+          <a:effectRef idx="1">
+            <a:schemeClr val="accent3"/>
+          </a:effectRef>
+          <a:fontRef idx="minor">
+            <a:schemeClr val="dk1"/>
+          </a:fontRef>
+        </p:style>
+        <p:txBody>
+          <a:bodyPr rtlCol="0" anchor="ctr"/>
+          <a:lstStyle/>
+          <a:p>
+            <a:pPr algn="ctr"/>
+            <a:endParaRPr lang="en-SG" sz="1400">
+              <a:solidFill>
+                <a:schemeClr val="dk1"/>
+              </a:solidFill>
+            </a:endParaRPr>
+          </a:p>
+        </p:txBody>
+      </p:sp>
+      <p:cxnSp>
+        <p:nvCxnSpPr>
+          <p:cNvPr id="86" name="Straight Connector 85">
+            <a:extLst>
+              <a:ext uri="{FF2B5EF4-FFF2-40B4-BE49-F238E27FC236}">
+                <a16:creationId xmlns:a16="http://schemas.microsoft.com/office/drawing/2014/main" id="{47E38F7D-A347-464A-BEB1-1962C6D27A59}"/>
+              </a:ext>
+            </a:extLst>
+          </p:cNvPr>
+          <p:cNvCxnSpPr>
+            <a:cxnSpLocks/>
+          </p:cNvCxnSpPr>
+          <p:nvPr/>
+        </p:nvCxnSpPr>
+        <p:spPr>
+          <a:xfrm>
+            <a:off x="7970658" y="3356149"/>
+            <a:ext cx="18112" cy="968224"/>
+          </a:xfrm>
+          <a:prstGeom prst="line">
+            <a:avLst/>
+          </a:prstGeom>
+          <a:ln w="19050">
+            <a:solidFill>
+              <a:srgbClr val="0070C0"/>
+            </a:solidFill>
+            <a:prstDash val="sysDash"/>
+          </a:ln>
+          <a:effectLst/>
+        </p:spPr>
+        <p:style>
+          <a:lnRef idx="1">
+            <a:schemeClr val="accent1"/>
+          </a:lnRef>
+          <a:fillRef idx="2">
+            <a:schemeClr val="accent1"/>
+          </a:fillRef>
+          <a:effectRef idx="1">
+            <a:schemeClr val="accent1"/>
+          </a:effectRef>
+          <a:fontRef idx="minor">
+            <a:schemeClr val="dk1"/>
+          </a:fontRef>
+        </p:style>
+      </p:cxnSp>
+      <p:cxnSp>
+        <p:nvCxnSpPr>
+          <p:cNvPr id="88" name="Straight Arrow Connector 87">
+            <a:extLst>
+              <a:ext uri="{FF2B5EF4-FFF2-40B4-BE49-F238E27FC236}">
+                <a16:creationId xmlns:a16="http://schemas.microsoft.com/office/drawing/2014/main" id="{84C5B727-0B75-44FD-ACA5-F29F6FEED183}"/>
+              </a:ext>
+            </a:extLst>
+          </p:cNvPr>
+          <p:cNvCxnSpPr>
+            <a:cxnSpLocks/>
+          </p:cNvCxnSpPr>
+          <p:nvPr/>
+        </p:nvCxnSpPr>
+        <p:spPr>
+          <a:xfrm>
+            <a:off x="5899672" y="4159402"/>
+            <a:ext cx="1961293" cy="0"/>
+          </a:xfrm>
+          <a:prstGeom prst="straightConnector1">
+            <a:avLst/>
+          </a:prstGeom>
+          <a:ln w="19050">
+            <a:solidFill>
+              <a:srgbClr val="0070C0"/>
+            </a:solidFill>
+            <a:prstDash val="sysDash"/>
+            <a:headEnd type="arrow" w="med" len="med"/>
+            <a:tailEnd type="none" w="med" len="med"/>
+          </a:ln>
+        </p:spPr>
+        <p:style>
+          <a:lnRef idx="1">
+            <a:schemeClr val="accent1"/>
+          </a:lnRef>
+          <a:fillRef idx="0">
+            <a:schemeClr val="accent1"/>
+          </a:fillRef>
+          <a:effectRef idx="0">
+            <a:schemeClr val="accent1"/>
+          </a:effectRef>
+          <a:fontRef idx="minor">
+            <a:schemeClr val="tx1"/>
+          </a:fontRef>
+        </p:style>
+      </p:cxnSp>
+      <p:sp>
+        <p:nvSpPr>
+          <p:cNvPr id="89" name="TextBox 88">
+            <a:extLst>
+              <a:ext uri="{FF2B5EF4-FFF2-40B4-BE49-F238E27FC236}">
+                <a16:creationId xmlns:a16="http://schemas.microsoft.com/office/drawing/2014/main" id="{DB63EFD7-4460-4B18-92DD-2521DB34ADAF}"/>
+              </a:ext>
+            </a:extLst>
+          </p:cNvPr>
+          <p:cNvSpPr txBox="1"/>
+          <p:nvPr/>
+        </p:nvSpPr>
+        <p:spPr>
+          <a:xfrm>
+            <a:off x="6015088" y="3405971"/>
+            <a:ext cx="875456" cy="169277"/>
+          </a:xfrm>
+          <a:prstGeom prst="rect">
+            <a:avLst/>
+          </a:prstGeom>
+          <a:noFill/>
+        </p:spPr>
+        <p:txBody>
+          <a:bodyPr wrap="square" lIns="0" tIns="0" rIns="0" bIns="0" rtlCol="0">
+            <a:spAutoFit/>
+          </a:bodyPr>
+          <a:lstStyle>
+            <a:defPPr>
+              <a:defRPr lang="en-US"/>
+            </a:defPPr>
+            <a:lvl1pPr algn="r">
+              <a:defRPr sz="1400">
+                <a:solidFill>
+                  <a:srgbClr val="0070C0"/>
+                </a:solidFill>
+              </a:defRPr>
+            </a:lvl1pPr>
+          </a:lstStyle>
+          <a:p>
+            <a:r>
+              <a:rPr lang="en-US" sz="1100" dirty="0" err="1"/>
+              <a:t>getParcelList</a:t>
+            </a:r>
+            <a:r>
+              <a:rPr lang="en-US" sz="1100" dirty="0"/>
+              <a:t>()</a:t>
+            </a:r>
+          </a:p>
+        </p:txBody>
+      </p:sp>
+      <p:sp>
+        <p:nvSpPr>
+          <p:cNvPr id="92" name="Rectangle 62">
+            <a:extLst>
+              <a:ext uri="{FF2B5EF4-FFF2-40B4-BE49-F238E27FC236}">
+                <a16:creationId xmlns:a16="http://schemas.microsoft.com/office/drawing/2014/main" id="{90BF93F4-E0BF-4DD1-BC14-AC640BCCF6F8}"/>
+              </a:ext>
+            </a:extLst>
+          </p:cNvPr>
+          <p:cNvSpPr/>
+          <p:nvPr/>
+        </p:nvSpPr>
+        <p:spPr>
+          <a:xfrm>
+            <a:off x="7983540" y="4414929"/>
+            <a:ext cx="1475293" cy="232757"/>
+          </a:xfrm>
+          <a:prstGeom prst="rect">
+            <a:avLst/>
+          </a:prstGeom>
+          <a:solidFill>
+            <a:srgbClr val="0070C0"/>
+          </a:solidFill>
+          <a:ln w="19050">
+            <a:solidFill>
+              <a:srgbClr val="0070C0"/>
+            </a:solidFill>
+          </a:ln>
+          <a:effectLst/>
+        </p:spPr>
+        <p:style>
+          <a:lnRef idx="1">
+            <a:schemeClr val="accent2"/>
+          </a:lnRef>
+          <a:fillRef idx="2">
+            <a:schemeClr val="accent2"/>
+          </a:fillRef>
+          <a:effectRef idx="1">
+            <a:schemeClr val="accent2"/>
+          </a:effectRef>
+          <a:fontRef idx="minor">
+            <a:schemeClr val="dk1"/>
+          </a:fontRef>
+        </p:style>
+        <p:txBody>
+          <a:bodyPr rtlCol="0" anchor="ctr"/>
+          <a:lstStyle/>
+          <a:p>
+            <a:pPr algn="ctr"/>
+            <a:r>
+              <a:rPr lang="en-US" sz="1200" dirty="0">
+                <a:solidFill>
+                  <a:schemeClr val="bg1"/>
+                </a:solidFill>
+              </a:rPr>
+              <a:t>c:ImportCommand</a:t>
+            </a:r>
+            <a:endParaRPr lang="en-SG" sz="1200" dirty="0">
+              <a:solidFill>
+                <a:schemeClr val="bg1"/>
+              </a:solidFill>
+            </a:endParaRPr>
+          </a:p>
+        </p:txBody>
+      </p:sp>
+      <p:sp>
+        <p:nvSpPr>
+          <p:cNvPr id="103" name="TextBox 102">
+            <a:extLst>
+              <a:ext uri="{FF2B5EF4-FFF2-40B4-BE49-F238E27FC236}">
+                <a16:creationId xmlns:a16="http://schemas.microsoft.com/office/drawing/2014/main" id="{E0DD9D79-A5A9-4AC0-A28E-7E55987E06AF}"/>
+              </a:ext>
+            </a:extLst>
+          </p:cNvPr>
+          <p:cNvSpPr txBox="1"/>
+          <p:nvPr/>
+        </p:nvSpPr>
+        <p:spPr>
+          <a:xfrm>
+            <a:off x="6124700" y="4318876"/>
+            <a:ext cx="1565109" cy="169277"/>
+          </a:xfrm>
+          <a:prstGeom prst="rect">
+            <a:avLst/>
+          </a:prstGeom>
+          <a:noFill/>
+        </p:spPr>
+        <p:txBody>
+          <a:bodyPr wrap="square" lIns="0" tIns="0" rIns="0" bIns="0" rtlCol="0">
+            <a:spAutoFit/>
+          </a:bodyPr>
+          <a:lstStyle>
+            <a:defPPr>
+              <a:defRPr lang="en-US"/>
+            </a:defPPr>
+            <a:lvl1pPr algn="r">
+              <a:defRPr sz="1400">
+                <a:solidFill>
+                  <a:srgbClr val="0070C0"/>
+                </a:solidFill>
+              </a:defRPr>
+            </a:lvl1pPr>
+          </a:lstStyle>
+          <a:p>
+            <a:r>
+              <a:rPr lang="en-US" sz="1100" dirty="0" err="1"/>
+              <a:t>ImportCommand</a:t>
+            </a:r>
+            <a:r>
+              <a:rPr lang="en-US" sz="1100" dirty="0"/>
+              <a:t>(parcels)</a:t>
+            </a:r>
+          </a:p>
+        </p:txBody>
+      </p:sp>
+      <p:sp>
+        <p:nvSpPr>
+          <p:cNvPr id="108" name="TextBox 107">
+            <a:extLst>
+              <a:ext uri="{FF2B5EF4-FFF2-40B4-BE49-F238E27FC236}">
+                <a16:creationId xmlns:a16="http://schemas.microsoft.com/office/drawing/2014/main" id="{1AD81EC9-DC95-444E-BF29-2293EE867FDC}"/>
+              </a:ext>
+            </a:extLst>
+          </p:cNvPr>
+          <p:cNvSpPr txBox="1"/>
+          <p:nvPr/>
+        </p:nvSpPr>
+        <p:spPr>
+          <a:xfrm>
+            <a:off x="7020894" y="4760980"/>
+            <a:ext cx="162205" cy="169277"/>
+          </a:xfrm>
+          <a:prstGeom prst="rect">
+            <a:avLst/>
+          </a:prstGeom>
+          <a:noFill/>
+        </p:spPr>
+        <p:txBody>
+          <a:bodyPr wrap="square" lIns="0" tIns="0" rIns="0" bIns="0" rtlCol="0">
+            <a:spAutoFit/>
+          </a:bodyPr>
+          <a:lstStyle>
+            <a:defPPr>
+              <a:defRPr lang="en-US"/>
+            </a:defPPr>
+            <a:lvl1pPr algn="r">
+              <a:defRPr sz="1400">
+                <a:solidFill>
+                  <a:srgbClr val="0070C0"/>
+                </a:solidFill>
+              </a:defRPr>
+            </a:lvl1pPr>
+          </a:lstStyle>
+          <a:p>
+            <a:r>
+              <a:rPr lang="en-US" sz="1100" dirty="0"/>
+              <a:t>c</a:t>
+            </a:r>
+          </a:p>
+        </p:txBody>
+      </p:sp>
+      <p:sp>
+        <p:nvSpPr>
+          <p:cNvPr id="112" name="TextBox 111">
+            <a:extLst>
+              <a:ext uri="{FF2B5EF4-FFF2-40B4-BE49-F238E27FC236}">
+                <a16:creationId xmlns:a16="http://schemas.microsoft.com/office/drawing/2014/main" id="{63A29FE1-FF15-4A03-9562-7FCE8CC1E870}"/>
+              </a:ext>
+            </a:extLst>
+          </p:cNvPr>
+          <p:cNvSpPr txBox="1"/>
+          <p:nvPr/>
+        </p:nvSpPr>
+        <p:spPr>
+          <a:xfrm>
+            <a:off x="4411305" y="4828592"/>
+            <a:ext cx="162205" cy="169277"/>
+          </a:xfrm>
+          <a:prstGeom prst="rect">
+            <a:avLst/>
+          </a:prstGeom>
+          <a:noFill/>
+        </p:spPr>
+        <p:txBody>
+          <a:bodyPr wrap="square" lIns="0" tIns="0" rIns="0" bIns="0" rtlCol="0">
+            <a:spAutoFit/>
+          </a:bodyPr>
+          <a:lstStyle>
+            <a:defPPr>
+              <a:defRPr lang="en-US"/>
+            </a:defPPr>
+            <a:lvl1pPr algn="r">
+              <a:defRPr sz="1400">
+                <a:solidFill>
+                  <a:srgbClr val="0070C0"/>
+                </a:solidFill>
+              </a:defRPr>
+            </a:lvl1pPr>
+          </a:lstStyle>
+          <a:p>
+            <a:r>
+              <a:rPr lang="en-US" sz="1100" dirty="0"/>
+              <a:t>c</a:t>
+            </a:r>
+          </a:p>
+        </p:txBody>
+      </p:sp>
+      <p:sp>
+        <p:nvSpPr>
+          <p:cNvPr id="96" name="Rectangle 62">
+            <a:extLst>
+              <a:ext uri="{FF2B5EF4-FFF2-40B4-BE49-F238E27FC236}">
+                <a16:creationId xmlns:a16="http://schemas.microsoft.com/office/drawing/2014/main" id="{04D2FF09-5648-4A2B-BE56-D44DDB223438}"/>
+              </a:ext>
+            </a:extLst>
+          </p:cNvPr>
+          <p:cNvSpPr/>
+          <p:nvPr/>
+        </p:nvSpPr>
+        <p:spPr>
+          <a:xfrm>
+            <a:off x="7101996" y="3124532"/>
+            <a:ext cx="1706465" cy="401291"/>
+          </a:xfrm>
+          <a:prstGeom prst="rect">
+            <a:avLst/>
+          </a:prstGeom>
+          <a:solidFill>
+            <a:srgbClr val="0070C0"/>
+          </a:solidFill>
+          <a:ln w="19050">
+            <a:solidFill>
+              <a:srgbClr val="0070C0"/>
+            </a:solidFill>
+          </a:ln>
+          <a:effectLst/>
+        </p:spPr>
+        <p:style>
+          <a:lnRef idx="1">
+            <a:schemeClr val="accent2"/>
+          </a:lnRef>
+          <a:fillRef idx="2">
+            <a:schemeClr val="accent2"/>
+          </a:fillRef>
+          <a:effectRef idx="1">
+            <a:schemeClr val="accent2"/>
+          </a:effectRef>
+          <a:fontRef idx="minor">
+            <a:schemeClr val="dk1"/>
+          </a:fontRef>
+        </p:style>
+        <p:txBody>
+          <a:bodyPr rtlCol="0" anchor="ctr"/>
+          <a:lstStyle/>
+          <a:p>
+            <a:pPr algn="ctr"/>
+            <a:r>
+              <a:rPr lang="en-US" sz="1200" dirty="0" err="1">
+                <a:solidFill>
+                  <a:schemeClr val="bg1"/>
+                </a:solidFill>
+              </a:rPr>
+              <a:t>readOnlyAddressBook</a:t>
+            </a:r>
+            <a:br>
+              <a:rPr lang="en-US" sz="1200" dirty="0">
+                <a:solidFill>
+                  <a:schemeClr val="bg1"/>
+                </a:solidFill>
+              </a:rPr>
+            </a:br>
+            <a:r>
+              <a:rPr lang="en-US" sz="1200" dirty="0">
+                <a:solidFill>
+                  <a:schemeClr val="bg1"/>
+                </a:solidFill>
+              </a:rPr>
+              <a:t>:</a:t>
+            </a:r>
+            <a:r>
+              <a:rPr lang="en-US" sz="1200" dirty="0" err="1">
+                <a:solidFill>
+                  <a:schemeClr val="bg1"/>
+                </a:solidFill>
+              </a:rPr>
+              <a:t>ReadOnlyAddressBook</a:t>
+            </a:r>
+            <a:endParaRPr lang="en-SG" sz="1200" dirty="0">
+              <a:solidFill>
+                <a:schemeClr val="bg1"/>
+              </a:solidFill>
+            </a:endParaRPr>
+          </a:p>
+        </p:txBody>
+      </p:sp>
+      <p:sp>
+        <p:nvSpPr>
+          <p:cNvPr id="122" name="Rectangle 121">
+            <a:extLst>
+              <a:ext uri="{FF2B5EF4-FFF2-40B4-BE49-F238E27FC236}">
+                <a16:creationId xmlns:a16="http://schemas.microsoft.com/office/drawing/2014/main" id="{4D150691-ED71-482F-AB85-F69B086CD15E}"/>
+              </a:ext>
+            </a:extLst>
+          </p:cNvPr>
+          <p:cNvSpPr/>
+          <p:nvPr/>
+        </p:nvSpPr>
+        <p:spPr>
+          <a:xfrm>
+            <a:off x="761291" y="5241554"/>
+            <a:ext cx="8128748" cy="581054"/>
+          </a:xfrm>
+          <a:prstGeom prst="rect">
+            <a:avLst/>
+          </a:prstGeom>
+          <a:solidFill>
+            <a:schemeClr val="accent2">
+              <a:lumMod val="40000"/>
+              <a:lumOff val="60000"/>
+            </a:schemeClr>
+          </a:solidFill>
+        </p:spPr>
+        <p:style>
+          <a:lnRef idx="2">
+            <a:schemeClr val="accent2">
+              <a:shade val="50000"/>
+            </a:schemeClr>
+          </a:lnRef>
+          <a:fillRef idx="1">
+            <a:schemeClr val="accent2"/>
+          </a:fillRef>
+          <a:effectRef idx="0">
+            <a:schemeClr val="accent2"/>
+          </a:effectRef>
+          <a:fontRef idx="minor">
+            <a:schemeClr val="lt1"/>
+          </a:fontRef>
+        </p:style>
+        <p:txBody>
+          <a:bodyPr rtlCol="0" anchor="ctr"/>
+          <a:lstStyle/>
+          <a:p>
+            <a:pPr algn="ctr"/>
+            <a:endParaRPr lang="en-SG"/>
+          </a:p>
+        </p:txBody>
+      </p:sp>
+      <p:sp>
+        <p:nvSpPr>
+          <p:cNvPr id="124" name="Rectangle: Single Corner Snipped 123">
+            <a:extLst>
+              <a:ext uri="{FF2B5EF4-FFF2-40B4-BE49-F238E27FC236}">
+                <a16:creationId xmlns:a16="http://schemas.microsoft.com/office/drawing/2014/main" id="{2EF0C970-534A-44D5-BF23-942A72138AD6}"/>
+              </a:ext>
+            </a:extLst>
+          </p:cNvPr>
+          <p:cNvSpPr/>
+          <p:nvPr/>
+        </p:nvSpPr>
+        <p:spPr>
+          <a:xfrm flipV="1">
+            <a:off x="762727" y="5241052"/>
+            <a:ext cx="494658" cy="233467"/>
+          </a:xfrm>
+          <a:prstGeom prst="snip1Rect">
+            <a:avLst/>
+          </a:prstGeom>
+          <a:solidFill>
+            <a:schemeClr val="bg1"/>
+          </a:solidFill>
+        </p:spPr>
+        <p:style>
+          <a:lnRef idx="2">
+            <a:schemeClr val="accent2">
+              <a:shade val="50000"/>
+            </a:schemeClr>
+          </a:lnRef>
+          <a:fillRef idx="1">
+            <a:schemeClr val="accent2"/>
+          </a:fillRef>
+          <a:effectRef idx="0">
+            <a:schemeClr val="accent2"/>
+          </a:effectRef>
+          <a:fontRef idx="minor">
+            <a:schemeClr val="lt1"/>
+          </a:fontRef>
+        </p:style>
+        <p:txBody>
+          <a:bodyPr rtlCol="0" anchor="ctr"/>
+          <a:lstStyle/>
+          <a:p>
+            <a:pPr algn="ctr"/>
+            <a:endParaRPr lang="en-SG" sz="1100" dirty="0">
+              <a:solidFill>
+                <a:schemeClr val="tx1"/>
+              </a:solidFill>
+            </a:endParaRPr>
+          </a:p>
+        </p:txBody>
+      </p:sp>
+      <p:sp>
+        <p:nvSpPr>
+          <p:cNvPr id="132" name="TextBox 131">
+            <a:extLst>
+              <a:ext uri="{FF2B5EF4-FFF2-40B4-BE49-F238E27FC236}">
+                <a16:creationId xmlns:a16="http://schemas.microsoft.com/office/drawing/2014/main" id="{3BF2455D-A0AC-45D8-B72D-7412FD02645D}"/>
+              </a:ext>
+            </a:extLst>
+          </p:cNvPr>
+          <p:cNvSpPr txBox="1"/>
+          <p:nvPr/>
+        </p:nvSpPr>
+        <p:spPr>
+          <a:xfrm>
+            <a:off x="789066" y="5269938"/>
+            <a:ext cx="305176" cy="169277"/>
+          </a:xfrm>
+          <a:prstGeom prst="rect">
+            <a:avLst/>
+          </a:prstGeom>
+          <a:noFill/>
+        </p:spPr>
+        <p:txBody>
+          <a:bodyPr wrap="square" lIns="0" tIns="0" rIns="0" bIns="0" rtlCol="0">
+            <a:spAutoFit/>
+          </a:bodyPr>
+          <a:lstStyle>
+            <a:defPPr>
+              <a:defRPr lang="en-US"/>
+            </a:defPPr>
+            <a:lvl1pPr algn="r">
+              <a:defRPr sz="1400">
+                <a:solidFill>
+                  <a:srgbClr val="0070C0"/>
+                </a:solidFill>
+              </a:defRPr>
+            </a:lvl1pPr>
+          </a:lstStyle>
+          <a:p>
+            <a:r>
+              <a:rPr lang="en-US" sz="1100" dirty="0">
+                <a:solidFill>
+                  <a:schemeClr val="tx1"/>
+                </a:solidFill>
+              </a:rPr>
+              <a:t>ref</a:t>
+            </a:r>
+          </a:p>
+        </p:txBody>
+      </p:sp>
+      <p:sp>
+        <p:nvSpPr>
+          <p:cNvPr id="133" name="TextBox 132">
+            <a:extLst>
+              <a:ext uri="{FF2B5EF4-FFF2-40B4-BE49-F238E27FC236}">
+                <a16:creationId xmlns:a16="http://schemas.microsoft.com/office/drawing/2014/main" id="{3FB1AC78-F0D9-46C2-BFF9-5A36701BAD49}"/>
+              </a:ext>
+            </a:extLst>
+          </p:cNvPr>
+          <p:cNvSpPr txBox="1"/>
+          <p:nvPr/>
+        </p:nvSpPr>
+        <p:spPr>
+          <a:xfrm>
+            <a:off x="1271624" y="5279696"/>
+            <a:ext cx="1636737" cy="169277"/>
+          </a:xfrm>
+          <a:prstGeom prst="rect">
+            <a:avLst/>
+          </a:prstGeom>
+          <a:noFill/>
+        </p:spPr>
+        <p:txBody>
+          <a:bodyPr wrap="square" lIns="0" tIns="0" rIns="0" bIns="0" rtlCol="0">
+            <a:spAutoFit/>
+          </a:bodyPr>
+          <a:lstStyle>
+            <a:defPPr>
+              <a:defRPr lang="en-US"/>
+            </a:defPPr>
+            <a:lvl1pPr algn="r">
+              <a:defRPr sz="1400">
+                <a:solidFill>
+                  <a:srgbClr val="0070C0"/>
+                </a:solidFill>
+              </a:defRPr>
+            </a:lvl1pPr>
+          </a:lstStyle>
+          <a:p>
+            <a:r>
+              <a:rPr lang="en-US" sz="1100" dirty="0">
+                <a:solidFill>
+                  <a:schemeClr val="tx1"/>
+                </a:solidFill>
+              </a:rPr>
+              <a:t>import command execution</a:t>
+            </a:r>
+          </a:p>
+        </p:txBody>
+      </p:sp>
     </p:spTree>
     <p:extLst>
       <p:ext uri="{BB962C8B-B14F-4D97-AF65-F5344CB8AC3E}">

</xml_diff>